<commit_message>
added template matching examples
</commit_message>
<xml_diff>
--- a/מפגש ראשון.pptx
+++ b/מפגש ראשון.pptx
@@ -5,14 +5,15 @@
     <p:sldMasterId id="2147483648" r:id="rId1"/>
   </p:sldMasterIdLst>
   <p:notesMasterIdLst>
-    <p:notesMasterId r:id="rId7"/>
+    <p:notesMasterId r:id="rId8"/>
   </p:notesMasterIdLst>
   <p:sldIdLst>
     <p:sldId id="256" r:id="rId2"/>
     <p:sldId id="257" r:id="rId3"/>
     <p:sldId id="258" r:id="rId4"/>
     <p:sldId id="259" r:id="rId5"/>
-    <p:sldId id="260" r:id="rId6"/>
+    <p:sldId id="261" r:id="rId6"/>
+    <p:sldId id="260" r:id="rId7"/>
   </p:sldIdLst>
   <p:sldSz cx="12192000" cy="6858000"/>
   <p:notesSz cx="6858000" cy="9144000"/>
@@ -201,7 +202,7 @@
           <a:p>
             <a:fld id="{F736A0E9-A958-4F50-A4A0-BD5FED897F5E}" type="datetimeFigureOut">
               <a:rPr lang="he-IL" smtClean="0"/>
-              <a:t>י"ז/כסלו/תשפ"ב</a:t>
+              <a:t>כ'/כסלו/תשפ"ב</a:t>
             </a:fld>
             <a:endParaRPr lang="he-IL"/>
           </a:p>
@@ -533,7 +534,7 @@
           <a:p>
             <a:fld id="{287F270B-542C-490C-83DA-64787F219BA7}" type="slidenum">
               <a:rPr lang="he-IL" smtClean="0"/>
-              <a:t>5</a:t>
+              <a:t>6</a:t>
             </a:fld>
             <a:endParaRPr lang="he-IL"/>
           </a:p>
@@ -701,7 +702,7 @@
           <a:p>
             <a:fld id="{DAE672F7-6408-455E-B58A-00240CB3F696}" type="datetimeFigureOut">
               <a:rPr lang="en-IL" smtClean="0"/>
-              <a:t>11/21/2021</a:t>
+              <a:t>24/11/2021</a:t>
             </a:fld>
             <a:endParaRPr lang="en-IL"/>
           </a:p>
@@ -901,7 +902,7 @@
           <a:p>
             <a:fld id="{DAE672F7-6408-455E-B58A-00240CB3F696}" type="datetimeFigureOut">
               <a:rPr lang="en-IL" smtClean="0"/>
-              <a:t>11/21/2021</a:t>
+              <a:t>24/11/2021</a:t>
             </a:fld>
             <a:endParaRPr lang="en-IL"/>
           </a:p>
@@ -1111,7 +1112,7 @@
           <a:p>
             <a:fld id="{DAE672F7-6408-455E-B58A-00240CB3F696}" type="datetimeFigureOut">
               <a:rPr lang="en-IL" smtClean="0"/>
-              <a:t>11/21/2021</a:t>
+              <a:t>24/11/2021</a:t>
             </a:fld>
             <a:endParaRPr lang="en-IL"/>
           </a:p>
@@ -1311,7 +1312,7 @@
           <a:p>
             <a:fld id="{DAE672F7-6408-455E-B58A-00240CB3F696}" type="datetimeFigureOut">
               <a:rPr lang="en-IL" smtClean="0"/>
-              <a:t>11/21/2021</a:t>
+              <a:t>24/11/2021</a:t>
             </a:fld>
             <a:endParaRPr lang="en-IL"/>
           </a:p>
@@ -1587,7 +1588,7 @@
           <a:p>
             <a:fld id="{DAE672F7-6408-455E-B58A-00240CB3F696}" type="datetimeFigureOut">
               <a:rPr lang="en-IL" smtClean="0"/>
-              <a:t>11/21/2021</a:t>
+              <a:t>24/11/2021</a:t>
             </a:fld>
             <a:endParaRPr lang="en-IL"/>
           </a:p>
@@ -1855,7 +1856,7 @@
           <a:p>
             <a:fld id="{DAE672F7-6408-455E-B58A-00240CB3F696}" type="datetimeFigureOut">
               <a:rPr lang="en-IL" smtClean="0"/>
-              <a:t>11/21/2021</a:t>
+              <a:t>24/11/2021</a:t>
             </a:fld>
             <a:endParaRPr lang="en-IL"/>
           </a:p>
@@ -2270,7 +2271,7 @@
           <a:p>
             <a:fld id="{DAE672F7-6408-455E-B58A-00240CB3F696}" type="datetimeFigureOut">
               <a:rPr lang="en-IL" smtClean="0"/>
-              <a:t>11/21/2021</a:t>
+              <a:t>24/11/2021</a:t>
             </a:fld>
             <a:endParaRPr lang="en-IL"/>
           </a:p>
@@ -2412,7 +2413,7 @@
           <a:p>
             <a:fld id="{DAE672F7-6408-455E-B58A-00240CB3F696}" type="datetimeFigureOut">
               <a:rPr lang="en-IL" smtClean="0"/>
-              <a:t>11/21/2021</a:t>
+              <a:t>24/11/2021</a:t>
             </a:fld>
             <a:endParaRPr lang="en-IL"/>
           </a:p>
@@ -2525,7 +2526,7 @@
           <a:p>
             <a:fld id="{DAE672F7-6408-455E-B58A-00240CB3F696}" type="datetimeFigureOut">
               <a:rPr lang="en-IL" smtClean="0"/>
-              <a:t>11/21/2021</a:t>
+              <a:t>24/11/2021</a:t>
             </a:fld>
             <a:endParaRPr lang="en-IL"/>
           </a:p>
@@ -2838,7 +2839,7 @@
           <a:p>
             <a:fld id="{DAE672F7-6408-455E-B58A-00240CB3F696}" type="datetimeFigureOut">
               <a:rPr lang="en-IL" smtClean="0"/>
-              <a:t>11/21/2021</a:t>
+              <a:t>24/11/2021</a:t>
             </a:fld>
             <a:endParaRPr lang="en-IL"/>
           </a:p>
@@ -3127,7 +3128,7 @@
           <a:p>
             <a:fld id="{DAE672F7-6408-455E-B58A-00240CB3F696}" type="datetimeFigureOut">
               <a:rPr lang="en-IL" smtClean="0"/>
-              <a:t>11/21/2021</a:t>
+              <a:t>24/11/2021</a:t>
             </a:fld>
             <a:endParaRPr lang="en-IL"/>
           </a:p>
@@ -3370,7 +3371,7 @@
           <a:p>
             <a:fld id="{DAE672F7-6408-455E-B58A-00240CB3F696}" type="datetimeFigureOut">
               <a:rPr lang="en-IL" smtClean="0"/>
-              <a:t>11/21/2021</a:t>
+              <a:t>24/11/2021</a:t>
             </a:fld>
             <a:endParaRPr lang="en-IL"/>
           </a:p>
@@ -4466,6 +4467,259 @@
 </file>
 
 <file path=ppt/slides/slide5.xml><?xml version="1.0" encoding="utf-8"?>
+<p:sld xmlns:a="http://schemas.openxmlformats.org/drawingml/2006/main" xmlns:r="http://schemas.openxmlformats.org/officeDocument/2006/relationships" xmlns:p="http://schemas.openxmlformats.org/presentationml/2006/main">
+  <p:cSld>
+    <p:spTree>
+      <p:nvGrpSpPr>
+        <p:cNvPr id="1" name=""/>
+        <p:cNvGrpSpPr/>
+        <p:nvPr/>
+      </p:nvGrpSpPr>
+      <p:grpSpPr>
+        <a:xfrm>
+          <a:off x="0" y="0"/>
+          <a:ext cx="0" cy="0"/>
+          <a:chOff x="0" y="0"/>
+          <a:chExt cx="0" cy="0"/>
+        </a:xfrm>
+      </p:grpSpPr>
+      <p:sp>
+        <p:nvSpPr>
+          <p:cNvPr id="2" name="Title 1">
+            <a:extLst>
+              <a:ext uri="{FF2B5EF4-FFF2-40B4-BE49-F238E27FC236}">
+                <a16:creationId xmlns:a16="http://schemas.microsoft.com/office/drawing/2014/main" id="{9EDF0AE3-08AE-4AB0-A0A0-70EF6D5E6C50}"/>
+              </a:ext>
+            </a:extLst>
+          </p:cNvPr>
+          <p:cNvSpPr>
+            <a:spLocks noGrp="1"/>
+          </p:cNvSpPr>
+          <p:nvPr>
+            <p:ph type="title"/>
+          </p:nvPr>
+        </p:nvSpPr>
+        <p:spPr/>
+        <p:txBody>
+          <a:bodyPr/>
+          <a:lstStyle/>
+          <a:p>
+            <a:r>
+              <a:rPr lang="en-US" dirty="0" err="1"/>
+              <a:t>FAsT</a:t>
+            </a:r>
+            <a:r>
+              <a:rPr lang="en-US" dirty="0"/>
+              <a:t>-Match: Fast Affine Template Matching</a:t>
+            </a:r>
+            <a:endParaRPr lang="en-IL" dirty="0"/>
+          </a:p>
+        </p:txBody>
+      </p:sp>
+      <p:pic>
+        <p:nvPicPr>
+          <p:cNvPr id="1028" name="Picture 4">
+            <a:extLst>
+              <a:ext uri="{FF2B5EF4-FFF2-40B4-BE49-F238E27FC236}">
+                <a16:creationId xmlns:a16="http://schemas.microsoft.com/office/drawing/2014/main" id="{264EED8B-1B88-4CE4-87AC-3697F00411AF}"/>
+              </a:ext>
+            </a:extLst>
+          </p:cNvPr>
+          <p:cNvPicPr>
+            <a:picLocks noChangeAspect="1" noChangeArrowheads="1"/>
+          </p:cNvPicPr>
+          <p:nvPr/>
+        </p:nvPicPr>
+        <p:blipFill>
+          <a:blip r:embed="rId2">
+            <a:extLst>
+              <a:ext uri="{28A0092B-C50C-407E-A947-70E740481C1C}">
+                <a14:useLocalDpi xmlns:a14="http://schemas.microsoft.com/office/drawing/2010/main" val="0"/>
+              </a:ext>
+            </a:extLst>
+          </a:blip>
+          <a:srcRect/>
+          <a:stretch>
+            <a:fillRect/>
+          </a:stretch>
+        </p:blipFill>
+        <p:spPr bwMode="auto">
+          <a:xfrm>
+            <a:off x="7158600" y="2043117"/>
+            <a:ext cx="4195200" cy="1800000"/>
+          </a:xfrm>
+          <a:prstGeom prst="rect">
+            <a:avLst/>
+          </a:prstGeom>
+          <a:noFill/>
+          <a:extLst>
+            <a:ext uri="{909E8E84-426E-40DD-AFC4-6F175D3DCCD1}">
+              <a14:hiddenFill xmlns:a14="http://schemas.microsoft.com/office/drawing/2010/main">
+                <a:solidFill>
+                  <a:srgbClr val="FFFFFF"/>
+                </a:solidFill>
+              </a14:hiddenFill>
+            </a:ext>
+          </a:extLst>
+        </p:spPr>
+      </p:pic>
+      <p:pic>
+        <p:nvPicPr>
+          <p:cNvPr id="1030" name="Picture 6">
+            <a:extLst>
+              <a:ext uri="{FF2B5EF4-FFF2-40B4-BE49-F238E27FC236}">
+                <a16:creationId xmlns:a16="http://schemas.microsoft.com/office/drawing/2014/main" id="{FB23E237-60F2-4635-B523-A7AD14F4AB32}"/>
+              </a:ext>
+            </a:extLst>
+          </p:cNvPr>
+          <p:cNvPicPr>
+            <a:picLocks noChangeAspect="1" noChangeArrowheads="1"/>
+          </p:cNvPicPr>
+          <p:nvPr/>
+        </p:nvPicPr>
+        <p:blipFill>
+          <a:blip r:embed="rId3">
+            <a:extLst>
+              <a:ext uri="{28A0092B-C50C-407E-A947-70E740481C1C}">
+                <a14:useLocalDpi xmlns:a14="http://schemas.microsoft.com/office/drawing/2010/main" val="0"/>
+              </a:ext>
+            </a:extLst>
+          </a:blip>
+          <a:srcRect/>
+          <a:stretch>
+            <a:fillRect/>
+          </a:stretch>
+        </p:blipFill>
+        <p:spPr bwMode="auto">
+          <a:xfrm>
+            <a:off x="1140297" y="4195546"/>
+            <a:ext cx="4195200" cy="1800000"/>
+          </a:xfrm>
+          <a:prstGeom prst="rect">
+            <a:avLst/>
+          </a:prstGeom>
+          <a:noFill/>
+          <a:extLst>
+            <a:ext uri="{909E8E84-426E-40DD-AFC4-6F175D3DCCD1}">
+              <a14:hiddenFill xmlns:a14="http://schemas.microsoft.com/office/drawing/2010/main">
+                <a:solidFill>
+                  <a:srgbClr val="FFFFFF"/>
+                </a:solidFill>
+              </a14:hiddenFill>
+            </a:ext>
+          </a:extLst>
+        </p:spPr>
+      </p:pic>
+      <p:pic>
+        <p:nvPicPr>
+          <p:cNvPr id="1032" name="Picture 8">
+            <a:extLst>
+              <a:ext uri="{FF2B5EF4-FFF2-40B4-BE49-F238E27FC236}">
+                <a16:creationId xmlns:a16="http://schemas.microsoft.com/office/drawing/2014/main" id="{32989B0B-0085-4F64-B70A-06D61FAE4F22}"/>
+              </a:ext>
+            </a:extLst>
+          </p:cNvPr>
+          <p:cNvPicPr>
+            <a:picLocks noChangeAspect="1" noChangeArrowheads="1"/>
+          </p:cNvPicPr>
+          <p:nvPr/>
+        </p:nvPicPr>
+        <p:blipFill>
+          <a:blip r:embed="rId4">
+            <a:extLst>
+              <a:ext uri="{28A0092B-C50C-407E-A947-70E740481C1C}">
+                <a14:useLocalDpi xmlns:a14="http://schemas.microsoft.com/office/drawing/2010/main" val="0"/>
+              </a:ext>
+            </a:extLst>
+          </a:blip>
+          <a:srcRect/>
+          <a:stretch>
+            <a:fillRect/>
+          </a:stretch>
+        </p:blipFill>
+        <p:spPr bwMode="auto">
+          <a:xfrm>
+            <a:off x="7158600" y="4195546"/>
+            <a:ext cx="4195200" cy="1800000"/>
+          </a:xfrm>
+          <a:prstGeom prst="rect">
+            <a:avLst/>
+          </a:prstGeom>
+          <a:noFill/>
+          <a:extLst>
+            <a:ext uri="{909E8E84-426E-40DD-AFC4-6F175D3DCCD1}">
+              <a14:hiddenFill xmlns:a14="http://schemas.microsoft.com/office/drawing/2010/main">
+                <a:solidFill>
+                  <a:srgbClr val="FFFFFF"/>
+                </a:solidFill>
+              </a14:hiddenFill>
+            </a:ext>
+          </a:extLst>
+        </p:spPr>
+      </p:pic>
+      <p:pic>
+        <p:nvPicPr>
+          <p:cNvPr id="1026" name="Picture 2">
+            <a:extLst>
+              <a:ext uri="{FF2B5EF4-FFF2-40B4-BE49-F238E27FC236}">
+                <a16:creationId xmlns:a16="http://schemas.microsoft.com/office/drawing/2014/main" id="{F646BF89-44CD-4F61-8931-AAC32EF6F719}"/>
+              </a:ext>
+            </a:extLst>
+          </p:cNvPr>
+          <p:cNvPicPr>
+            <a:picLocks noGrp="1" noChangeAspect="1" noChangeArrowheads="1"/>
+          </p:cNvPicPr>
+          <p:nvPr>
+            <p:ph idx="1"/>
+          </p:nvPr>
+        </p:nvPicPr>
+        <p:blipFill>
+          <a:blip r:embed="rId5">
+            <a:extLst>
+              <a:ext uri="{28A0092B-C50C-407E-A947-70E740481C1C}">
+                <a14:useLocalDpi xmlns:a14="http://schemas.microsoft.com/office/drawing/2010/main" val="0"/>
+              </a:ext>
+            </a:extLst>
+          </a:blip>
+          <a:srcRect/>
+          <a:stretch>
+            <a:fillRect/>
+          </a:stretch>
+        </p:blipFill>
+        <p:spPr bwMode="auto">
+          <a:xfrm>
+            <a:off x="838200" y="2043117"/>
+            <a:ext cx="4497297" cy="1800000"/>
+          </a:xfrm>
+          <a:prstGeom prst="rect">
+            <a:avLst/>
+          </a:prstGeom>
+          <a:noFill/>
+          <a:extLst>
+            <a:ext uri="{909E8E84-426E-40DD-AFC4-6F175D3DCCD1}">
+              <a14:hiddenFill xmlns:a14="http://schemas.microsoft.com/office/drawing/2010/main">
+                <a:solidFill>
+                  <a:srgbClr val="FFFFFF"/>
+                </a:solidFill>
+              </a14:hiddenFill>
+            </a:ext>
+          </a:extLst>
+        </p:spPr>
+      </p:pic>
+    </p:spTree>
+    <p:extLst>
+      <p:ext uri="{BB962C8B-B14F-4D97-AF65-F5344CB8AC3E}">
+        <p14:creationId xmlns:p14="http://schemas.microsoft.com/office/powerpoint/2010/main" val="1955986334"/>
+      </p:ext>
+    </p:extLst>
+  </p:cSld>
+  <p:clrMapOvr>
+    <a:masterClrMapping/>
+  </p:clrMapOvr>
+</p:sld>
+</file>
+
+<file path=ppt/slides/slide6.xml><?xml version="1.0" encoding="utf-8"?>
 <p:sld xmlns:a="http://schemas.openxmlformats.org/drawingml/2006/main" xmlns:r="http://schemas.openxmlformats.org/officeDocument/2006/relationships" xmlns:p="http://schemas.openxmlformats.org/presentationml/2006/main">
   <p:cSld>
     <p:spTree>

</xml_diff>